<commit_message>
Zmieniono przedstawienie przykładu z silnią
</commit_message>
<xml_diff>
--- a/Wprowadzenie do rekurencji/I. Wprowadzenie do rekurencji/Rekurencja.pptx
+++ b/Wprowadzenie do rekurencji/I. Wprowadzenie do rekurencji/Rekurencja.pptx
@@ -5,13 +5,23 @@
     <p:sldMasterId id="2147483648" r:id="rId1"/>
   </p:sldMasterIdLst>
   <p:notesMasterIdLst>
-    <p:notesMasterId r:id="rId6"/>
+    <p:notesMasterId r:id="rId16"/>
   </p:notesMasterIdLst>
   <p:sldIdLst>
     <p:sldId id="256" r:id="rId2"/>
     <p:sldId id="257" r:id="rId3"/>
     <p:sldId id="258" r:id="rId4"/>
     <p:sldId id="259" r:id="rId5"/>
+    <p:sldId id="261" r:id="rId6"/>
+    <p:sldId id="262" r:id="rId7"/>
+    <p:sldId id="263" r:id="rId8"/>
+    <p:sldId id="264" r:id="rId9"/>
+    <p:sldId id="265" r:id="rId10"/>
+    <p:sldId id="267" r:id="rId11"/>
+    <p:sldId id="268" r:id="rId12"/>
+    <p:sldId id="269" r:id="rId13"/>
+    <p:sldId id="270" r:id="rId14"/>
+    <p:sldId id="266" r:id="rId15"/>
   </p:sldIdLst>
   <p:sldSz cx="12192000" cy="6858000"/>
   <p:notesSz cx="6858000" cy="9144000"/>
@@ -212,7 +222,7 @@
             <a:fld id="{BBA41131-26B7-40CD-BEB9-05F6C32AAE2D}" type="datetimeFigureOut">
               <a:rPr lang="pl-PL"/>
               <a:pPr/>
-              <a:t>07.05.2018</a:t>
+              <a:t>21.06.2018</a:t>
             </a:fld>
             <a:endParaRPr lang="pl-PL"/>
           </a:p>
@@ -610,7 +620,7 @@
             <a:fld id="{F98AA868-8872-43E4-8C98-D34DABD1FD38}" type="datetimeFigureOut">
               <a:rPr lang="pl-PL" smtClean="0"/>
               <a:pPr/>
-              <a:t>07.05.2018</a:t>
+              <a:t>21.06.2018</a:t>
             </a:fld>
             <a:endParaRPr lang="pl-PL"/>
           </a:p>
@@ -780,7 +790,7 @@
             <a:fld id="{F98AA868-8872-43E4-8C98-D34DABD1FD38}" type="datetimeFigureOut">
               <a:rPr lang="pl-PL" smtClean="0"/>
               <a:pPr/>
-              <a:t>07.05.2018</a:t>
+              <a:t>21.06.2018</a:t>
             </a:fld>
             <a:endParaRPr lang="pl-PL"/>
           </a:p>
@@ -960,7 +970,7 @@
             <a:fld id="{F98AA868-8872-43E4-8C98-D34DABD1FD38}" type="datetimeFigureOut">
               <a:rPr lang="pl-PL" smtClean="0"/>
               <a:pPr/>
-              <a:t>07.05.2018</a:t>
+              <a:t>21.06.2018</a:t>
             </a:fld>
             <a:endParaRPr lang="pl-PL"/>
           </a:p>
@@ -1130,7 +1140,7 @@
             <a:fld id="{F98AA868-8872-43E4-8C98-D34DABD1FD38}" type="datetimeFigureOut">
               <a:rPr lang="pl-PL" smtClean="0"/>
               <a:pPr/>
-              <a:t>07.05.2018</a:t>
+              <a:t>21.06.2018</a:t>
             </a:fld>
             <a:endParaRPr lang="pl-PL"/>
           </a:p>
@@ -1377,7 +1387,7 @@
             <a:fld id="{F98AA868-8872-43E4-8C98-D34DABD1FD38}" type="datetimeFigureOut">
               <a:rPr lang="pl-PL" smtClean="0"/>
               <a:pPr/>
-              <a:t>07.05.2018</a:t>
+              <a:t>21.06.2018</a:t>
             </a:fld>
             <a:endParaRPr lang="pl-PL"/>
           </a:p>
@@ -1608,7 +1618,7 @@
             <a:fld id="{F98AA868-8872-43E4-8C98-D34DABD1FD38}" type="datetimeFigureOut">
               <a:rPr lang="pl-PL" smtClean="0"/>
               <a:pPr/>
-              <a:t>07.05.2018</a:t>
+              <a:t>21.06.2018</a:t>
             </a:fld>
             <a:endParaRPr lang="pl-PL"/>
           </a:p>
@@ -1974,7 +1984,7 @@
             <a:fld id="{F98AA868-8872-43E4-8C98-D34DABD1FD38}" type="datetimeFigureOut">
               <a:rPr lang="pl-PL" smtClean="0"/>
               <a:pPr/>
-              <a:t>07.05.2018</a:t>
+              <a:t>21.06.2018</a:t>
             </a:fld>
             <a:endParaRPr lang="pl-PL"/>
           </a:p>
@@ -2093,7 +2103,7 @@
             <a:fld id="{F98AA868-8872-43E4-8C98-D34DABD1FD38}" type="datetimeFigureOut">
               <a:rPr lang="pl-PL" smtClean="0"/>
               <a:pPr/>
-              <a:t>07.05.2018</a:t>
+              <a:t>21.06.2018</a:t>
             </a:fld>
             <a:endParaRPr lang="pl-PL"/>
           </a:p>
@@ -2190,7 +2200,7 @@
             <a:fld id="{F98AA868-8872-43E4-8C98-D34DABD1FD38}" type="datetimeFigureOut">
               <a:rPr lang="pl-PL" smtClean="0"/>
               <a:pPr/>
-              <a:t>07.05.2018</a:t>
+              <a:t>21.06.2018</a:t>
             </a:fld>
             <a:endParaRPr lang="pl-PL"/>
           </a:p>
@@ -2467,7 +2477,7 @@
             <a:fld id="{F98AA868-8872-43E4-8C98-D34DABD1FD38}" type="datetimeFigureOut">
               <a:rPr lang="pl-PL" smtClean="0"/>
               <a:pPr/>
-              <a:t>07.05.2018</a:t>
+              <a:t>21.06.2018</a:t>
             </a:fld>
             <a:endParaRPr lang="pl-PL"/>
           </a:p>
@@ -2721,7 +2731,7 @@
             <a:fld id="{F98AA868-8872-43E4-8C98-D34DABD1FD38}" type="datetimeFigureOut">
               <a:rPr lang="pl-PL" smtClean="0"/>
               <a:pPr/>
-              <a:t>07.05.2018</a:t>
+              <a:t>21.06.2018</a:t>
             </a:fld>
             <a:endParaRPr lang="pl-PL"/>
           </a:p>
@@ -2934,7 +2944,7 @@
             <a:fld id="{F98AA868-8872-43E4-8C98-D34DABD1FD38}" type="datetimeFigureOut">
               <a:rPr lang="pl-PL" smtClean="0"/>
               <a:pPr/>
-              <a:t>07.05.2018</a:t>
+              <a:t>21.06.2018</a:t>
             </a:fld>
             <a:endParaRPr lang="pl-PL"/>
           </a:p>
@@ -3381,6 +3391,885 @@
 </p:sld>
 </file>
 
+<file path=ppt/slides/slide10.xml><?xml version="1.0" encoding="utf-8"?>
+<p:sld xmlns:a="http://schemas.openxmlformats.org/drawingml/2006/main" xmlns:r="http://schemas.openxmlformats.org/officeDocument/2006/relationships" xmlns:p="http://schemas.openxmlformats.org/presentationml/2006/main">
+  <p:cSld>
+    <p:spTree>
+      <p:nvGrpSpPr>
+        <p:cNvPr id="1" name=""/>
+        <p:cNvGrpSpPr/>
+        <p:nvPr/>
+      </p:nvGrpSpPr>
+      <p:grpSpPr>
+        <a:xfrm>
+          <a:off x="0" y="0"/>
+          <a:ext cx="0" cy="0"/>
+          <a:chOff x="0" y="0"/>
+          <a:chExt cx="0" cy="0"/>
+        </a:xfrm>
+      </p:grpSpPr>
+      <p:sp>
+        <p:nvSpPr>
+          <p:cNvPr id="2" name="Tytuł 1">
+            <a:extLst>
+              <a:ext uri="{FF2B5EF4-FFF2-40B4-BE49-F238E27FC236}">
+                <a16:creationId xmlns:a16="http://schemas.microsoft.com/office/drawing/2014/main" id="{C0878A23-B92A-7A47-BF02-F4CC707E8DE3}"/>
+              </a:ext>
+            </a:extLst>
+          </p:cNvPr>
+          <p:cNvSpPr>
+            <a:spLocks noGrp="1"/>
+          </p:cNvSpPr>
+          <p:nvPr>
+            <p:ph type="title"/>
+          </p:nvPr>
+        </p:nvSpPr>
+        <p:spPr/>
+        <p:txBody>
+          <a:bodyPr/>
+          <a:lstStyle/>
+          <a:p>
+            <a:r>
+              <a:rPr lang="pl-PL" dirty="0"/>
+              <a:t>Inny przykład: </a:t>
+            </a:r>
+            <a:r>
+              <a:rPr lang="pl-PL" b="1" dirty="0"/>
+              <a:t>silnia</a:t>
+            </a:r>
+          </a:p>
+        </p:txBody>
+      </p:sp>
+      <p:sp>
+        <p:nvSpPr>
+          <p:cNvPr id="3" name="Symbol zastępczy zawartości 2">
+            <a:extLst>
+              <a:ext uri="{FF2B5EF4-FFF2-40B4-BE49-F238E27FC236}">
+                <a16:creationId xmlns:a16="http://schemas.microsoft.com/office/drawing/2014/main" id="{999B1010-B8A2-2F4B-B974-DF090733E966}"/>
+              </a:ext>
+            </a:extLst>
+          </p:cNvPr>
+          <p:cNvSpPr>
+            <a:spLocks noGrp="1"/>
+          </p:cNvSpPr>
+          <p:nvPr>
+            <p:ph idx="1"/>
+          </p:nvPr>
+        </p:nvSpPr>
+        <p:spPr/>
+        <p:txBody>
+          <a:bodyPr/>
+          <a:lstStyle/>
+          <a:p>
+            <a:pPr marL="0" indent="0">
+              <a:buNone/>
+            </a:pPr>
+            <a:r>
+              <a:rPr lang="pl-PL" b="1" dirty="0">
+                <a:latin typeface="Consolas" panose="020B0609020204030204" pitchFamily="49" charset="0"/>
+                <a:cs typeface="Consolas" panose="020B0609020204030204" pitchFamily="49" charset="0"/>
+              </a:rPr>
+              <a:t>3! = 3 * 2!</a:t>
+            </a:r>
+          </a:p>
+          <a:p>
+            <a:pPr marL="0" indent="0">
+              <a:buNone/>
+            </a:pPr>
+            <a:endParaRPr lang="pl-PL" b="1" dirty="0">
+              <a:latin typeface="Consolas" panose="020B0609020204030204" pitchFamily="49" charset="0"/>
+              <a:cs typeface="Consolas" panose="020B0609020204030204" pitchFamily="49" charset="0"/>
+            </a:endParaRPr>
+          </a:p>
+          <a:p>
+            <a:pPr marL="0" indent="0">
+              <a:buNone/>
+            </a:pPr>
+            <a:r>
+              <a:rPr lang="pl-PL" b="1" dirty="0">
+                <a:latin typeface="Consolas" panose="020B0609020204030204" pitchFamily="49" charset="0"/>
+                <a:cs typeface="Consolas" panose="020B0609020204030204" pitchFamily="49" charset="0"/>
+              </a:rPr>
+              <a:t>2! = 2 * </a:t>
+            </a:r>
+            <a:r>
+              <a:rPr lang="pl-PL" b="1" dirty="0">
+                <a:solidFill>
+                  <a:srgbClr val="FF0000"/>
+                </a:solidFill>
+                <a:latin typeface="Consolas" panose="020B0609020204030204" pitchFamily="49" charset="0"/>
+                <a:cs typeface="Consolas" panose="020B0609020204030204" pitchFamily="49" charset="0"/>
+              </a:rPr>
+              <a:t>1 -&gt; 2! = 2</a:t>
+            </a:r>
+          </a:p>
+          <a:p>
+            <a:r>
+              <a:rPr lang="pl-PL" dirty="0">
+                <a:cs typeface="Consolas" panose="020B0609020204030204" pitchFamily="49" charset="0"/>
+              </a:rPr>
+              <a:t>Wiemy już ile to 1!, więc skorzystajmy z tego</a:t>
+            </a:r>
+          </a:p>
+          <a:p>
+            <a:pPr marL="0" indent="0">
+              <a:buNone/>
+            </a:pPr>
+            <a:r>
+              <a:rPr lang="pl-PL" b="1" dirty="0">
+                <a:latin typeface="Consolas" panose="020B0609020204030204" pitchFamily="49" charset="0"/>
+                <a:cs typeface="Consolas" panose="020B0609020204030204" pitchFamily="49" charset="0"/>
+              </a:rPr>
+              <a:t>1! = </a:t>
+            </a:r>
+            <a:r>
+              <a:rPr lang="pl-PL" b="1" dirty="0">
+                <a:solidFill>
+                  <a:srgbClr val="FF0000"/>
+                </a:solidFill>
+                <a:latin typeface="Consolas" panose="020B0609020204030204" pitchFamily="49" charset="0"/>
+                <a:cs typeface="Consolas" panose="020B0609020204030204" pitchFamily="49" charset="0"/>
+              </a:rPr>
+              <a:t>1</a:t>
+            </a:r>
+          </a:p>
+          <a:p>
+            <a:r>
+              <a:rPr lang="pl-PL" dirty="0"/>
+              <a:t>Mamy wynik, możemy </a:t>
+            </a:r>
+            <a:r>
+              <a:rPr lang="pl-PL" b="1" dirty="0"/>
+              <a:t>wracać</a:t>
+            </a:r>
+            <a:endParaRPr lang="pl-PL" b="1" dirty="0">
+              <a:latin typeface="Consolas" panose="020B0609020204030204" pitchFamily="49" charset="0"/>
+              <a:cs typeface="Consolas" panose="020B0609020204030204" pitchFamily="49" charset="0"/>
+            </a:endParaRPr>
+          </a:p>
+        </p:txBody>
+      </p:sp>
+    </p:spTree>
+    <p:extLst>
+      <p:ext uri="{BB962C8B-B14F-4D97-AF65-F5344CB8AC3E}">
+        <p14:creationId xmlns:p14="http://schemas.microsoft.com/office/powerpoint/2010/main" val="557466912"/>
+      </p:ext>
+    </p:extLst>
+  </p:cSld>
+  <p:clrMapOvr>
+    <a:masterClrMapping/>
+  </p:clrMapOvr>
+</p:sld>
+</file>
+
+<file path=ppt/slides/slide11.xml><?xml version="1.0" encoding="utf-8"?>
+<p:sld xmlns:a="http://schemas.openxmlformats.org/drawingml/2006/main" xmlns:r="http://schemas.openxmlformats.org/officeDocument/2006/relationships" xmlns:p="http://schemas.openxmlformats.org/presentationml/2006/main">
+  <p:cSld>
+    <p:spTree>
+      <p:nvGrpSpPr>
+        <p:cNvPr id="1" name=""/>
+        <p:cNvGrpSpPr/>
+        <p:nvPr/>
+      </p:nvGrpSpPr>
+      <p:grpSpPr>
+        <a:xfrm>
+          <a:off x="0" y="0"/>
+          <a:ext cx="0" cy="0"/>
+          <a:chOff x="0" y="0"/>
+          <a:chExt cx="0" cy="0"/>
+        </a:xfrm>
+      </p:grpSpPr>
+      <p:sp>
+        <p:nvSpPr>
+          <p:cNvPr id="2" name="Tytuł 1">
+            <a:extLst>
+              <a:ext uri="{FF2B5EF4-FFF2-40B4-BE49-F238E27FC236}">
+                <a16:creationId xmlns:a16="http://schemas.microsoft.com/office/drawing/2014/main" id="{C0878A23-B92A-7A47-BF02-F4CC707E8DE3}"/>
+              </a:ext>
+            </a:extLst>
+          </p:cNvPr>
+          <p:cNvSpPr>
+            <a:spLocks noGrp="1"/>
+          </p:cNvSpPr>
+          <p:nvPr>
+            <p:ph type="title"/>
+          </p:nvPr>
+        </p:nvSpPr>
+        <p:spPr/>
+        <p:txBody>
+          <a:bodyPr/>
+          <a:lstStyle/>
+          <a:p>
+            <a:r>
+              <a:rPr lang="pl-PL" dirty="0"/>
+              <a:t>Inny przykład: </a:t>
+            </a:r>
+            <a:r>
+              <a:rPr lang="pl-PL" b="1" dirty="0"/>
+              <a:t>silnia</a:t>
+            </a:r>
+          </a:p>
+        </p:txBody>
+      </p:sp>
+      <p:sp>
+        <p:nvSpPr>
+          <p:cNvPr id="3" name="Symbol zastępczy zawartości 2">
+            <a:extLst>
+              <a:ext uri="{FF2B5EF4-FFF2-40B4-BE49-F238E27FC236}">
+                <a16:creationId xmlns:a16="http://schemas.microsoft.com/office/drawing/2014/main" id="{999B1010-B8A2-2F4B-B974-DF090733E966}"/>
+              </a:ext>
+            </a:extLst>
+          </p:cNvPr>
+          <p:cNvSpPr>
+            <a:spLocks noGrp="1"/>
+          </p:cNvSpPr>
+          <p:nvPr>
+            <p:ph idx="1"/>
+          </p:nvPr>
+        </p:nvSpPr>
+        <p:spPr/>
+        <p:txBody>
+          <a:bodyPr/>
+          <a:lstStyle/>
+          <a:p>
+            <a:pPr marL="0" indent="0">
+              <a:buNone/>
+            </a:pPr>
+            <a:r>
+              <a:rPr lang="pl-PL" b="1" dirty="0">
+                <a:latin typeface="Consolas" panose="020B0609020204030204" pitchFamily="49" charset="0"/>
+                <a:cs typeface="Consolas" panose="020B0609020204030204" pitchFamily="49" charset="0"/>
+              </a:rPr>
+              <a:t>3! = 3 * </a:t>
+            </a:r>
+            <a:r>
+              <a:rPr lang="pl-PL" b="1" dirty="0">
+                <a:solidFill>
+                  <a:srgbClr val="FF0000"/>
+                </a:solidFill>
+                <a:latin typeface="Consolas" panose="020B0609020204030204" pitchFamily="49" charset="0"/>
+                <a:cs typeface="Consolas" panose="020B0609020204030204" pitchFamily="49" charset="0"/>
+              </a:rPr>
+              <a:t>2 -&gt; 3! = 6</a:t>
+            </a:r>
+          </a:p>
+          <a:p>
+            <a:r>
+              <a:rPr lang="pl-PL" dirty="0">
+                <a:cs typeface="Consolas" panose="020B0609020204030204" pitchFamily="49" charset="0"/>
+              </a:rPr>
+              <a:t>Obliczyliśmy ile wynosi 2!, pozostał tylko jeden krok</a:t>
+            </a:r>
+          </a:p>
+          <a:p>
+            <a:pPr marL="0" indent="0">
+              <a:buNone/>
+            </a:pPr>
+            <a:r>
+              <a:rPr lang="pl-PL" b="1" dirty="0">
+                <a:latin typeface="Consolas" panose="020B0609020204030204" pitchFamily="49" charset="0"/>
+                <a:cs typeface="Consolas" panose="020B0609020204030204" pitchFamily="49" charset="0"/>
+              </a:rPr>
+              <a:t>2! = </a:t>
+            </a:r>
+            <a:r>
+              <a:rPr lang="pl-PL" b="1" dirty="0">
+                <a:solidFill>
+                  <a:srgbClr val="FF0000"/>
+                </a:solidFill>
+                <a:latin typeface="Consolas" panose="020B0609020204030204" pitchFamily="49" charset="0"/>
+                <a:cs typeface="Consolas" panose="020B0609020204030204" pitchFamily="49" charset="0"/>
+              </a:rPr>
+              <a:t>2</a:t>
+            </a:r>
+          </a:p>
+          <a:p>
+            <a:r>
+              <a:rPr lang="pl-PL" dirty="0">
+                <a:cs typeface="Consolas" panose="020B0609020204030204" pitchFamily="49" charset="0"/>
+              </a:rPr>
+              <a:t>Wiemy już ile to 1!, więc skorzystajmy z tego</a:t>
+            </a:r>
+          </a:p>
+          <a:p>
+            <a:pPr marL="0" indent="0">
+              <a:buNone/>
+            </a:pPr>
+            <a:r>
+              <a:rPr lang="pl-PL" b="1" dirty="0">
+                <a:latin typeface="Consolas" panose="020B0609020204030204" pitchFamily="49" charset="0"/>
+                <a:cs typeface="Consolas" panose="020B0609020204030204" pitchFamily="49" charset="0"/>
+              </a:rPr>
+              <a:t>1! = 1</a:t>
+            </a:r>
+          </a:p>
+          <a:p>
+            <a:r>
+              <a:rPr lang="pl-PL" dirty="0"/>
+              <a:t>Mamy wynik, możemy </a:t>
+            </a:r>
+            <a:r>
+              <a:rPr lang="pl-PL" b="1" dirty="0"/>
+              <a:t>wracać</a:t>
+            </a:r>
+            <a:endParaRPr lang="pl-PL" b="1" dirty="0">
+              <a:latin typeface="Consolas" panose="020B0609020204030204" pitchFamily="49" charset="0"/>
+              <a:cs typeface="Consolas" panose="020B0609020204030204" pitchFamily="49" charset="0"/>
+            </a:endParaRPr>
+          </a:p>
+        </p:txBody>
+      </p:sp>
+    </p:spTree>
+    <p:extLst>
+      <p:ext uri="{BB962C8B-B14F-4D97-AF65-F5344CB8AC3E}">
+        <p14:creationId xmlns:p14="http://schemas.microsoft.com/office/powerpoint/2010/main" val="1099793074"/>
+      </p:ext>
+    </p:extLst>
+  </p:cSld>
+  <p:clrMapOvr>
+    <a:masterClrMapping/>
+  </p:clrMapOvr>
+</p:sld>
+</file>
+
+<file path=ppt/slides/slide12.xml><?xml version="1.0" encoding="utf-8"?>
+<p:sld xmlns:a="http://schemas.openxmlformats.org/drawingml/2006/main" xmlns:r="http://schemas.openxmlformats.org/officeDocument/2006/relationships" xmlns:p="http://schemas.openxmlformats.org/presentationml/2006/main">
+  <p:cSld>
+    <p:spTree>
+      <p:nvGrpSpPr>
+        <p:cNvPr id="1" name=""/>
+        <p:cNvGrpSpPr/>
+        <p:nvPr/>
+      </p:nvGrpSpPr>
+      <p:grpSpPr>
+        <a:xfrm>
+          <a:off x="0" y="0"/>
+          <a:ext cx="0" cy="0"/>
+          <a:chOff x="0" y="0"/>
+          <a:chExt cx="0" cy="0"/>
+        </a:xfrm>
+      </p:grpSpPr>
+      <p:sp>
+        <p:nvSpPr>
+          <p:cNvPr id="2" name="Tytuł 1">
+            <a:extLst>
+              <a:ext uri="{FF2B5EF4-FFF2-40B4-BE49-F238E27FC236}">
+                <a16:creationId xmlns:a16="http://schemas.microsoft.com/office/drawing/2014/main" id="{7A85F7F3-8AAD-6D42-A5DC-F9FD8F952E3A}"/>
+              </a:ext>
+            </a:extLst>
+          </p:cNvPr>
+          <p:cNvSpPr>
+            <a:spLocks noGrp="1"/>
+          </p:cNvSpPr>
+          <p:nvPr>
+            <p:ph type="title"/>
+          </p:nvPr>
+        </p:nvSpPr>
+        <p:spPr/>
+        <p:txBody>
+          <a:bodyPr/>
+          <a:lstStyle/>
+          <a:p>
+            <a:r>
+              <a:rPr lang="pl-PL" dirty="0"/>
+              <a:t>Schemat obliczeń</a:t>
+            </a:r>
+          </a:p>
+        </p:txBody>
+      </p:sp>
+      <mc:AlternateContent xmlns:mc="http://schemas.openxmlformats.org/markup-compatibility/2006">
+        <mc:Choice xmlns:a14="http://schemas.microsoft.com/office/drawing/2010/main" Requires="a14">
+          <p:sp>
+            <p:nvSpPr>
+              <p:cNvPr id="3" name="Symbol zastępczy zawartości 2">
+                <a:extLst>
+                  <a:ext uri="{FF2B5EF4-FFF2-40B4-BE49-F238E27FC236}">
+                    <a16:creationId xmlns:a16="http://schemas.microsoft.com/office/drawing/2014/main" id="{A0DAD3EC-7F63-C14B-819C-07C2C99A7E70}"/>
+                  </a:ext>
+                </a:extLst>
+              </p:cNvPr>
+              <p:cNvSpPr>
+                <a:spLocks noGrp="1"/>
+              </p:cNvSpPr>
+              <p:nvPr>
+                <p:ph idx="1"/>
+              </p:nvPr>
+            </p:nvSpPr>
+            <p:spPr/>
+            <p:txBody>
+              <a:bodyPr/>
+              <a:lstStyle/>
+              <a:p>
+                <a:r>
+                  <a:rPr lang="pl-PL" dirty="0"/>
+                  <a:t>Nasze obliczenia przebiegały następująco:</a:t>
+                </a:r>
+              </a:p>
+              <a:p>
+                <a:endParaRPr lang="pl-PL" dirty="0"/>
+              </a:p>
+              <a:p>
+                <a:pPr marL="0" indent="0">
+                  <a:buNone/>
+                </a:pPr>
+                <a14:m>
+                  <m:oMathPara xmlns:m="http://schemas.openxmlformats.org/officeDocument/2006/math">
+                    <m:oMathParaPr>
+                      <m:jc m:val="centerGroup"/>
+                    </m:oMathParaPr>
+                    <m:oMath xmlns:m="http://schemas.openxmlformats.org/officeDocument/2006/math">
+                      <m:r>
+                        <a:rPr lang="pl-PL" b="0" i="1" smtClean="0">
+                          <a:latin typeface="Cambria Math" panose="02040503050406030204" pitchFamily="18" charset="0"/>
+                        </a:rPr>
+                        <m:t>3!=3∗2!→2!=2∗1!→1!=1</m:t>
+                      </m:r>
+                    </m:oMath>
+                  </m:oMathPara>
+                </a14:m>
+                <a:endParaRPr lang="pl-PL" dirty="0"/>
+              </a:p>
+            </p:txBody>
+          </p:sp>
+        </mc:Choice>
+        <mc:Fallback>
+          <p:sp>
+            <p:nvSpPr>
+              <p:cNvPr id="3" name="Symbol zastępczy zawartości 2">
+                <a:extLst>
+                  <a:ext uri="{FF2B5EF4-FFF2-40B4-BE49-F238E27FC236}">
+                    <a16:creationId xmlns:a16="http://schemas.microsoft.com/office/drawing/2014/main" id="{A0DAD3EC-7F63-C14B-819C-07C2C99A7E70}"/>
+                  </a:ext>
+                </a:extLst>
+              </p:cNvPr>
+              <p:cNvSpPr>
+                <a:spLocks noGrp="1" noRot="1" noChangeAspect="1" noMove="1" noResize="1" noEditPoints="1" noAdjustHandles="1" noChangeArrowheads="1" noChangeShapeType="1" noTextEdit="1"/>
+              </p:cNvSpPr>
+              <p:nvPr>
+                <p:ph idx="1"/>
+              </p:nvPr>
+            </p:nvSpPr>
+            <p:spPr>
+              <a:blipFill>
+                <a:blip r:embed="rId2"/>
+                <a:stretch>
+                  <a:fillRect l="-965" t="-2632"/>
+                </a:stretch>
+              </a:blipFill>
+            </p:spPr>
+            <p:txBody>
+              <a:bodyPr/>
+              <a:lstStyle/>
+              <a:p>
+                <a:r>
+                  <a:rPr lang="pl-PL">
+                    <a:noFill/>
+                  </a:rPr>
+                  <a:t> </a:t>
+                </a:r>
+              </a:p>
+            </p:txBody>
+          </p:sp>
+        </mc:Fallback>
+      </mc:AlternateContent>
+    </p:spTree>
+    <p:extLst>
+      <p:ext uri="{BB962C8B-B14F-4D97-AF65-F5344CB8AC3E}">
+        <p14:creationId xmlns:p14="http://schemas.microsoft.com/office/powerpoint/2010/main" val="1281652516"/>
+      </p:ext>
+    </p:extLst>
+  </p:cSld>
+  <p:clrMapOvr>
+    <a:masterClrMapping/>
+  </p:clrMapOvr>
+</p:sld>
+</file>
+
+<file path=ppt/slides/slide13.xml><?xml version="1.0" encoding="utf-8"?>
+<p:sld xmlns:a="http://schemas.openxmlformats.org/drawingml/2006/main" xmlns:r="http://schemas.openxmlformats.org/officeDocument/2006/relationships" xmlns:p="http://schemas.openxmlformats.org/presentationml/2006/main">
+  <p:cSld>
+    <p:spTree>
+      <p:nvGrpSpPr>
+        <p:cNvPr id="1" name=""/>
+        <p:cNvGrpSpPr/>
+        <p:nvPr/>
+      </p:nvGrpSpPr>
+      <p:grpSpPr>
+        <a:xfrm>
+          <a:off x="0" y="0"/>
+          <a:ext cx="0" cy="0"/>
+          <a:chOff x="0" y="0"/>
+          <a:chExt cx="0" cy="0"/>
+        </a:xfrm>
+      </p:grpSpPr>
+      <p:sp>
+        <p:nvSpPr>
+          <p:cNvPr id="2" name="Tytuł 1">
+            <a:extLst>
+              <a:ext uri="{FF2B5EF4-FFF2-40B4-BE49-F238E27FC236}">
+                <a16:creationId xmlns:a16="http://schemas.microsoft.com/office/drawing/2014/main" id="{7A85F7F3-8AAD-6D42-A5DC-F9FD8F952E3A}"/>
+              </a:ext>
+            </a:extLst>
+          </p:cNvPr>
+          <p:cNvSpPr>
+            <a:spLocks noGrp="1"/>
+          </p:cNvSpPr>
+          <p:nvPr>
+            <p:ph type="title"/>
+          </p:nvPr>
+        </p:nvSpPr>
+        <p:spPr/>
+        <p:txBody>
+          <a:bodyPr/>
+          <a:lstStyle/>
+          <a:p>
+            <a:r>
+              <a:rPr lang="pl-PL" dirty="0"/>
+              <a:t>Schemat obliczeń</a:t>
+            </a:r>
+          </a:p>
+        </p:txBody>
+      </p:sp>
+      <mc:AlternateContent xmlns:mc="http://schemas.openxmlformats.org/markup-compatibility/2006">
+        <mc:Choice xmlns:a14="http://schemas.microsoft.com/office/drawing/2010/main" Requires="a14">
+          <p:sp>
+            <p:nvSpPr>
+              <p:cNvPr id="3" name="Symbol zastępczy zawartości 2">
+                <a:extLst>
+                  <a:ext uri="{FF2B5EF4-FFF2-40B4-BE49-F238E27FC236}">
+                    <a16:creationId xmlns:a16="http://schemas.microsoft.com/office/drawing/2014/main" id="{A0DAD3EC-7F63-C14B-819C-07C2C99A7E70}"/>
+                  </a:ext>
+                </a:extLst>
+              </p:cNvPr>
+              <p:cNvSpPr>
+                <a:spLocks noGrp="1"/>
+              </p:cNvSpPr>
+              <p:nvPr>
+                <p:ph idx="1"/>
+              </p:nvPr>
+            </p:nvSpPr>
+            <p:spPr/>
+            <p:txBody>
+              <a:bodyPr/>
+              <a:lstStyle/>
+              <a:p>
+                <a:r>
+                  <a:rPr lang="pl-PL" dirty="0"/>
+                  <a:t>Nasze obliczenia przebiegały następująco:</a:t>
+                </a:r>
+              </a:p>
+              <a:p>
+                <a:endParaRPr lang="pl-PL" dirty="0"/>
+              </a:p>
+              <a:p>
+                <a:pPr marL="0" indent="0">
+                  <a:buNone/>
+                </a:pPr>
+                <a14:m>
+                  <m:oMathPara xmlns:m="http://schemas.openxmlformats.org/officeDocument/2006/math">
+                    <m:oMathParaPr>
+                      <m:jc m:val="centerGroup"/>
+                    </m:oMathParaPr>
+                    <m:oMath xmlns:m="http://schemas.openxmlformats.org/officeDocument/2006/math">
+                      <m:r>
+                        <a:rPr lang="pl-PL" b="0" i="1" smtClean="0">
+                          <a:latin typeface="Cambria Math" panose="02040503050406030204" pitchFamily="18" charset="0"/>
+                        </a:rPr>
+                        <m:t>3!=3∗2!→2!=2∗1!→1!=1</m:t>
+                      </m:r>
+                    </m:oMath>
+                  </m:oMathPara>
+                </a14:m>
+                <a:endParaRPr lang="pl-PL" dirty="0"/>
+              </a:p>
+              <a:p>
+                <a:pPr marL="0" indent="0">
+                  <a:buNone/>
+                </a:pPr>
+                <a:endParaRPr lang="pl-PL" dirty="0"/>
+              </a:p>
+              <a:p>
+                <a:r>
+                  <a:rPr lang="pl-PL" dirty="0"/>
+                  <a:t>I w drugą stronę:</a:t>
+                </a:r>
+              </a:p>
+              <a:p>
+                <a:endParaRPr lang="pl-PL" dirty="0"/>
+              </a:p>
+              <a:p>
+                <a:pPr marL="0" indent="0">
+                  <a:buNone/>
+                </a:pPr>
+                <a14:m>
+                  <m:oMathPara xmlns:m="http://schemas.openxmlformats.org/officeDocument/2006/math">
+                    <m:oMathParaPr>
+                      <m:jc m:val="centerGroup"/>
+                    </m:oMathParaPr>
+                    <m:oMath xmlns:m="http://schemas.openxmlformats.org/officeDocument/2006/math">
+                      <m:r>
+                        <a:rPr lang="pl-PL" i="1">
+                          <a:latin typeface="Cambria Math" panose="02040503050406030204" pitchFamily="18" charset="0"/>
+                          <a:ea typeface="Cambria Math" panose="02040503050406030204" pitchFamily="18" charset="0"/>
+                        </a:rPr>
+                        <m:t>3</m:t>
+                      </m:r>
+                      <m:r>
+                        <a:rPr lang="pl-PL" b="0" i="1" smtClean="0">
+                          <a:latin typeface="Cambria Math" panose="02040503050406030204" pitchFamily="18" charset="0"/>
+                          <a:ea typeface="Cambria Math" panose="02040503050406030204" pitchFamily="18" charset="0"/>
+                        </a:rPr>
+                        <m:t>!=3∗2</m:t>
+                      </m:r>
+                      <m:r>
+                        <a:rPr lang="pl-PL" i="1">
+                          <a:latin typeface="Cambria Math" panose="02040503050406030204" pitchFamily="18" charset="0"/>
+                          <a:ea typeface="Cambria Math" panose="02040503050406030204" pitchFamily="18" charset="0"/>
+                        </a:rPr>
+                        <m:t>←</m:t>
+                      </m:r>
+                      <m:r>
+                        <a:rPr lang="pl-PL" b="0" i="1" smtClean="0">
+                          <a:latin typeface="Cambria Math" panose="02040503050406030204" pitchFamily="18" charset="0"/>
+                          <a:ea typeface="Cambria Math" panose="02040503050406030204" pitchFamily="18" charset="0"/>
+                        </a:rPr>
+                        <m:t>2!=2∗1←</m:t>
+                      </m:r>
+                      <m:r>
+                        <a:rPr lang="pl-PL" b="0" i="1" smtClean="0">
+                          <a:latin typeface="Cambria Math" panose="02040503050406030204" pitchFamily="18" charset="0"/>
+                        </a:rPr>
+                        <m:t>1!=1</m:t>
+                      </m:r>
+                    </m:oMath>
+                  </m:oMathPara>
+                </a14:m>
+                <a:endParaRPr lang="pl-PL" dirty="0"/>
+              </a:p>
+            </p:txBody>
+          </p:sp>
+        </mc:Choice>
+        <mc:Fallback>
+          <p:sp>
+            <p:nvSpPr>
+              <p:cNvPr id="3" name="Symbol zastępczy zawartości 2">
+                <a:extLst>
+                  <a:ext uri="{FF2B5EF4-FFF2-40B4-BE49-F238E27FC236}">
+                    <a16:creationId xmlns:a16="http://schemas.microsoft.com/office/drawing/2014/main" id="{A0DAD3EC-7F63-C14B-819C-07C2C99A7E70}"/>
+                  </a:ext>
+                </a:extLst>
+              </p:cNvPr>
+              <p:cNvSpPr>
+                <a:spLocks noGrp="1" noRot="1" noChangeAspect="1" noMove="1" noResize="1" noEditPoints="1" noAdjustHandles="1" noChangeArrowheads="1" noChangeShapeType="1" noTextEdit="1"/>
+              </p:cNvSpPr>
+              <p:nvPr>
+                <p:ph idx="1"/>
+              </p:nvPr>
+            </p:nvSpPr>
+            <p:spPr>
+              <a:blipFill>
+                <a:blip r:embed="rId2"/>
+                <a:stretch>
+                  <a:fillRect l="-965" t="-2632"/>
+                </a:stretch>
+              </a:blipFill>
+            </p:spPr>
+            <p:txBody>
+              <a:bodyPr/>
+              <a:lstStyle/>
+              <a:p>
+                <a:r>
+                  <a:rPr lang="pl-PL">
+                    <a:noFill/>
+                  </a:rPr>
+                  <a:t> </a:t>
+                </a:r>
+              </a:p>
+            </p:txBody>
+          </p:sp>
+        </mc:Fallback>
+      </mc:AlternateContent>
+    </p:spTree>
+    <p:extLst>
+      <p:ext uri="{BB962C8B-B14F-4D97-AF65-F5344CB8AC3E}">
+        <p14:creationId xmlns:p14="http://schemas.microsoft.com/office/powerpoint/2010/main" val="2776898295"/>
+      </p:ext>
+    </p:extLst>
+  </p:cSld>
+  <p:clrMapOvr>
+    <a:masterClrMapping/>
+  </p:clrMapOvr>
+</p:sld>
+</file>
+
+<file path=ppt/slides/slide14.xml><?xml version="1.0" encoding="utf-8"?>
+<p:sld xmlns:a="http://schemas.openxmlformats.org/drawingml/2006/main" xmlns:r="http://schemas.openxmlformats.org/officeDocument/2006/relationships" xmlns:p="http://schemas.openxmlformats.org/presentationml/2006/main" show="0">
+  <p:cSld>
+    <p:spTree>
+      <p:nvGrpSpPr>
+        <p:cNvPr id="1" name=""/>
+        <p:cNvGrpSpPr/>
+        <p:nvPr/>
+      </p:nvGrpSpPr>
+      <p:grpSpPr>
+        <a:xfrm>
+          <a:off x="0" y="0"/>
+          <a:ext cx="0" cy="0"/>
+          <a:chOff x="0" y="0"/>
+          <a:chExt cx="0" cy="0"/>
+        </a:xfrm>
+      </p:grpSpPr>
+      <p:sp>
+        <p:nvSpPr>
+          <p:cNvPr id="2" name="Tytuł 1">
+            <a:extLst>
+              <a:ext uri="{FF2B5EF4-FFF2-40B4-BE49-F238E27FC236}">
+                <a16:creationId xmlns:a16="http://schemas.microsoft.com/office/drawing/2014/main" id="{C0878A23-B92A-7A47-BF02-F4CC707E8DE3}"/>
+              </a:ext>
+            </a:extLst>
+          </p:cNvPr>
+          <p:cNvSpPr>
+            <a:spLocks noGrp="1"/>
+          </p:cNvSpPr>
+          <p:nvPr>
+            <p:ph type="title"/>
+          </p:nvPr>
+        </p:nvSpPr>
+        <p:spPr/>
+        <p:txBody>
+          <a:bodyPr/>
+          <a:lstStyle/>
+          <a:p>
+            <a:r>
+              <a:rPr lang="pl-PL" dirty="0"/>
+              <a:t>Inny przykład: </a:t>
+            </a:r>
+            <a:r>
+              <a:rPr lang="pl-PL" b="1" dirty="0"/>
+              <a:t>silnia</a:t>
+            </a:r>
+          </a:p>
+        </p:txBody>
+      </p:sp>
+      <p:sp>
+        <p:nvSpPr>
+          <p:cNvPr id="3" name="Symbol zastępczy zawartości 2">
+            <a:extLst>
+              <a:ext uri="{FF2B5EF4-FFF2-40B4-BE49-F238E27FC236}">
+                <a16:creationId xmlns:a16="http://schemas.microsoft.com/office/drawing/2014/main" id="{999B1010-B8A2-2F4B-B974-DF090733E966}"/>
+              </a:ext>
+            </a:extLst>
+          </p:cNvPr>
+          <p:cNvSpPr>
+            <a:spLocks noGrp="1"/>
+          </p:cNvSpPr>
+          <p:nvPr>
+            <p:ph idx="1"/>
+          </p:nvPr>
+        </p:nvSpPr>
+        <p:spPr/>
+        <p:txBody>
+          <a:bodyPr/>
+          <a:lstStyle/>
+          <a:p>
+            <a:pPr marL="0" indent="0">
+              <a:buNone/>
+            </a:pPr>
+            <a:r>
+              <a:rPr lang="pl-PL" b="1" dirty="0">
+                <a:latin typeface="Consolas" panose="020B0609020204030204" pitchFamily="49" charset="0"/>
+                <a:cs typeface="Consolas" panose="020B0609020204030204" pitchFamily="49" charset="0"/>
+              </a:rPr>
+              <a:t>3! = 3 * 2!</a:t>
+            </a:r>
+          </a:p>
+          <a:p>
+            <a:r>
+              <a:rPr lang="pl-PL" dirty="0"/>
+              <a:t>Ale najpierw musimy policzyć </a:t>
+            </a:r>
+            <a:r>
+              <a:rPr lang="pl-PL" b="1" dirty="0">
+                <a:latin typeface="Consolas" panose="020B0609020204030204" pitchFamily="49" charset="0"/>
+                <a:cs typeface="Consolas" panose="020B0609020204030204" pitchFamily="49" charset="0"/>
+              </a:rPr>
+              <a:t>2!</a:t>
+            </a:r>
+          </a:p>
+          <a:p>
+            <a:pPr marL="0" indent="0">
+              <a:buNone/>
+            </a:pPr>
+            <a:r>
+              <a:rPr lang="pl-PL" b="1" dirty="0">
+                <a:latin typeface="Consolas" panose="020B0609020204030204" pitchFamily="49" charset="0"/>
+                <a:cs typeface="Consolas" panose="020B0609020204030204" pitchFamily="49" charset="0"/>
+              </a:rPr>
+              <a:t>2! = 2 * 1!</a:t>
+            </a:r>
+          </a:p>
+          <a:p>
+            <a:r>
+              <a:rPr lang="pl-PL" dirty="0"/>
+              <a:t>Teraz musimy policzyć </a:t>
+            </a:r>
+            <a:r>
+              <a:rPr lang="pl-PL" b="1" dirty="0">
+                <a:latin typeface="Consolas" panose="020B0609020204030204" pitchFamily="49" charset="0"/>
+                <a:cs typeface="Consolas" panose="020B0609020204030204" pitchFamily="49" charset="0"/>
+              </a:rPr>
+              <a:t>1!</a:t>
+            </a:r>
+          </a:p>
+          <a:p>
+            <a:pPr marL="0" indent="0">
+              <a:buNone/>
+            </a:pPr>
+            <a:r>
+              <a:rPr lang="pl-PL" b="1" dirty="0">
+                <a:latin typeface="Consolas" panose="020B0609020204030204" pitchFamily="49" charset="0"/>
+                <a:cs typeface="Consolas" panose="020B0609020204030204" pitchFamily="49" charset="0"/>
+              </a:rPr>
+              <a:t>1! = 1</a:t>
+            </a:r>
+          </a:p>
+          <a:p>
+            <a:r>
+              <a:rPr lang="pl-PL" dirty="0"/>
+              <a:t>Koniec!</a:t>
+            </a:r>
+          </a:p>
+          <a:p>
+            <a:endParaRPr lang="pl-PL" dirty="0"/>
+          </a:p>
+          <a:p>
+            <a:r>
+              <a:rPr lang="pl-PL" dirty="0"/>
+              <a:t>Ogólnie: </a:t>
+            </a:r>
+            <a:r>
+              <a:rPr lang="pl-PL" b="1" dirty="0">
+                <a:latin typeface="Consolas" panose="020B0609020204030204" pitchFamily="49" charset="0"/>
+                <a:cs typeface="Consolas" panose="020B0609020204030204" pitchFamily="49" charset="0"/>
+              </a:rPr>
+              <a:t>n! = n * (n-1)!</a:t>
+            </a:r>
+          </a:p>
+        </p:txBody>
+      </p:sp>
+    </p:spTree>
+    <p:extLst>
+      <p:ext uri="{BB962C8B-B14F-4D97-AF65-F5344CB8AC3E}">
+        <p14:creationId xmlns:p14="http://schemas.microsoft.com/office/powerpoint/2010/main" val="882906986"/>
+      </p:ext>
+    </p:extLst>
+  </p:cSld>
+  <p:clrMapOvr>
+    <a:masterClrMapping/>
+  </p:clrMapOvr>
+</p:sld>
+</file>
+
 <file path=ppt/slides/slide2.xml><?xml version="1.0" encoding="utf-8"?>
 <p:sld xmlns:a="http://schemas.openxmlformats.org/drawingml/2006/main" xmlns:r="http://schemas.openxmlformats.org/officeDocument/2006/relationships" xmlns:p="http://schemas.openxmlformats.org/presentationml/2006/main">
   <p:cSld>
@@ -3853,6 +4742,224 @@
               <a:t>3! = 3 * 2!</a:t>
             </a:r>
           </a:p>
+        </p:txBody>
+      </p:sp>
+    </p:spTree>
+    <p:extLst>
+      <p:ext uri="{BB962C8B-B14F-4D97-AF65-F5344CB8AC3E}">
+        <p14:creationId xmlns:p14="http://schemas.microsoft.com/office/powerpoint/2010/main" val="3775809350"/>
+      </p:ext>
+    </p:extLst>
+  </p:cSld>
+  <p:clrMapOvr>
+    <a:masterClrMapping/>
+  </p:clrMapOvr>
+</p:sld>
+</file>
+
+<file path=ppt/slides/slide5.xml><?xml version="1.0" encoding="utf-8"?>
+<p:sld xmlns:a="http://schemas.openxmlformats.org/drawingml/2006/main" xmlns:r="http://schemas.openxmlformats.org/officeDocument/2006/relationships" xmlns:p="http://schemas.openxmlformats.org/presentationml/2006/main">
+  <p:cSld>
+    <p:spTree>
+      <p:nvGrpSpPr>
+        <p:cNvPr id="1" name=""/>
+        <p:cNvGrpSpPr/>
+        <p:nvPr/>
+      </p:nvGrpSpPr>
+      <p:grpSpPr>
+        <a:xfrm>
+          <a:off x="0" y="0"/>
+          <a:ext cx="0" cy="0"/>
+          <a:chOff x="0" y="0"/>
+          <a:chExt cx="0" cy="0"/>
+        </a:xfrm>
+      </p:grpSpPr>
+      <p:sp>
+        <p:nvSpPr>
+          <p:cNvPr id="2" name="Tytuł 1">
+            <a:extLst>
+              <a:ext uri="{FF2B5EF4-FFF2-40B4-BE49-F238E27FC236}">
+                <a16:creationId xmlns:a16="http://schemas.microsoft.com/office/drawing/2014/main" id="{C0878A23-B92A-7A47-BF02-F4CC707E8DE3}"/>
+              </a:ext>
+            </a:extLst>
+          </p:cNvPr>
+          <p:cNvSpPr>
+            <a:spLocks noGrp="1"/>
+          </p:cNvSpPr>
+          <p:nvPr>
+            <p:ph type="title"/>
+          </p:nvPr>
+        </p:nvSpPr>
+        <p:spPr/>
+        <p:txBody>
+          <a:bodyPr/>
+          <a:lstStyle/>
+          <a:p>
+            <a:r>
+              <a:rPr lang="pl-PL" dirty="0"/>
+              <a:t>Inny przykład: </a:t>
+            </a:r>
+            <a:r>
+              <a:rPr lang="pl-PL" b="1" dirty="0"/>
+              <a:t>silnia</a:t>
+            </a:r>
+          </a:p>
+        </p:txBody>
+      </p:sp>
+      <p:sp>
+        <p:nvSpPr>
+          <p:cNvPr id="3" name="Symbol zastępczy zawartości 2">
+            <a:extLst>
+              <a:ext uri="{FF2B5EF4-FFF2-40B4-BE49-F238E27FC236}">
+                <a16:creationId xmlns:a16="http://schemas.microsoft.com/office/drawing/2014/main" id="{999B1010-B8A2-2F4B-B974-DF090733E966}"/>
+              </a:ext>
+            </a:extLst>
+          </p:cNvPr>
+          <p:cNvSpPr>
+            <a:spLocks noGrp="1"/>
+          </p:cNvSpPr>
+          <p:nvPr>
+            <p:ph idx="1"/>
+          </p:nvPr>
+        </p:nvSpPr>
+        <p:spPr/>
+        <p:txBody>
+          <a:bodyPr/>
+          <a:lstStyle/>
+          <a:p>
+            <a:pPr marL="0" indent="0">
+              <a:buNone/>
+            </a:pPr>
+            <a:r>
+              <a:rPr lang="pl-PL" b="1" dirty="0">
+                <a:latin typeface="Consolas" panose="020B0609020204030204" pitchFamily="49" charset="0"/>
+                <a:cs typeface="Consolas" panose="020B0609020204030204" pitchFamily="49" charset="0"/>
+              </a:rPr>
+              <a:t>3! = 3 * </a:t>
+            </a:r>
+            <a:r>
+              <a:rPr lang="pl-PL" b="1" dirty="0">
+                <a:solidFill>
+                  <a:srgbClr val="FF0000"/>
+                </a:solidFill>
+                <a:latin typeface="Consolas" panose="020B0609020204030204" pitchFamily="49" charset="0"/>
+                <a:cs typeface="Consolas" panose="020B0609020204030204" pitchFamily="49" charset="0"/>
+              </a:rPr>
+              <a:t>2!</a:t>
+            </a:r>
+          </a:p>
+          <a:p>
+            <a:r>
+              <a:rPr lang="pl-PL" dirty="0"/>
+              <a:t>Ale najpierw musimy policzyć </a:t>
+            </a:r>
+            <a:r>
+              <a:rPr lang="pl-PL" b="1" dirty="0">
+                <a:solidFill>
+                  <a:srgbClr val="FF0000"/>
+                </a:solidFill>
+                <a:latin typeface="Consolas" panose="020B0609020204030204" pitchFamily="49" charset="0"/>
+                <a:cs typeface="Consolas" panose="020B0609020204030204" pitchFamily="49" charset="0"/>
+              </a:rPr>
+              <a:t>2!</a:t>
+            </a:r>
+          </a:p>
+        </p:txBody>
+      </p:sp>
+    </p:spTree>
+    <p:extLst>
+      <p:ext uri="{BB962C8B-B14F-4D97-AF65-F5344CB8AC3E}">
+        <p14:creationId xmlns:p14="http://schemas.microsoft.com/office/powerpoint/2010/main" val="259552175"/>
+      </p:ext>
+    </p:extLst>
+  </p:cSld>
+  <p:clrMapOvr>
+    <a:masterClrMapping/>
+  </p:clrMapOvr>
+</p:sld>
+</file>
+
+<file path=ppt/slides/slide6.xml><?xml version="1.0" encoding="utf-8"?>
+<p:sld xmlns:a="http://schemas.openxmlformats.org/drawingml/2006/main" xmlns:r="http://schemas.openxmlformats.org/officeDocument/2006/relationships" xmlns:p="http://schemas.openxmlformats.org/presentationml/2006/main">
+  <p:cSld>
+    <p:spTree>
+      <p:nvGrpSpPr>
+        <p:cNvPr id="1" name=""/>
+        <p:cNvGrpSpPr/>
+        <p:nvPr/>
+      </p:nvGrpSpPr>
+      <p:grpSpPr>
+        <a:xfrm>
+          <a:off x="0" y="0"/>
+          <a:ext cx="0" cy="0"/>
+          <a:chOff x="0" y="0"/>
+          <a:chExt cx="0" cy="0"/>
+        </a:xfrm>
+      </p:grpSpPr>
+      <p:sp>
+        <p:nvSpPr>
+          <p:cNvPr id="2" name="Tytuł 1">
+            <a:extLst>
+              <a:ext uri="{FF2B5EF4-FFF2-40B4-BE49-F238E27FC236}">
+                <a16:creationId xmlns:a16="http://schemas.microsoft.com/office/drawing/2014/main" id="{C0878A23-B92A-7A47-BF02-F4CC707E8DE3}"/>
+              </a:ext>
+            </a:extLst>
+          </p:cNvPr>
+          <p:cNvSpPr>
+            <a:spLocks noGrp="1"/>
+          </p:cNvSpPr>
+          <p:nvPr>
+            <p:ph type="title"/>
+          </p:nvPr>
+        </p:nvSpPr>
+        <p:spPr/>
+        <p:txBody>
+          <a:bodyPr/>
+          <a:lstStyle/>
+          <a:p>
+            <a:r>
+              <a:rPr lang="pl-PL" dirty="0"/>
+              <a:t>Inny przykład: </a:t>
+            </a:r>
+            <a:r>
+              <a:rPr lang="pl-PL" b="1" dirty="0"/>
+              <a:t>silnia</a:t>
+            </a:r>
+          </a:p>
+        </p:txBody>
+      </p:sp>
+      <p:sp>
+        <p:nvSpPr>
+          <p:cNvPr id="3" name="Symbol zastępczy zawartości 2">
+            <a:extLst>
+              <a:ext uri="{FF2B5EF4-FFF2-40B4-BE49-F238E27FC236}">
+                <a16:creationId xmlns:a16="http://schemas.microsoft.com/office/drawing/2014/main" id="{999B1010-B8A2-2F4B-B974-DF090733E966}"/>
+              </a:ext>
+            </a:extLst>
+          </p:cNvPr>
+          <p:cNvSpPr>
+            <a:spLocks noGrp="1"/>
+          </p:cNvSpPr>
+          <p:nvPr>
+            <p:ph idx="1"/>
+          </p:nvPr>
+        </p:nvSpPr>
+        <p:spPr/>
+        <p:txBody>
+          <a:bodyPr/>
+          <a:lstStyle/>
+          <a:p>
+            <a:pPr marL="0" indent="0">
+              <a:buNone/>
+            </a:pPr>
+            <a:r>
+              <a:rPr lang="pl-PL" b="1" dirty="0">
+                <a:latin typeface="Consolas" panose="020B0609020204030204" pitchFamily="49" charset="0"/>
+                <a:cs typeface="Consolas" panose="020B0609020204030204" pitchFamily="49" charset="0"/>
+              </a:rPr>
+              <a:t>3! = 3 * 2!</a:t>
+            </a:r>
+          </a:p>
           <a:p>
             <a:r>
               <a:rPr lang="pl-PL" dirty="0"/>
@@ -3878,6 +4985,274 @@
               <a:t>2! = 2 * 1!</a:t>
             </a:r>
           </a:p>
+        </p:txBody>
+      </p:sp>
+    </p:spTree>
+    <p:extLst>
+      <p:ext uri="{BB962C8B-B14F-4D97-AF65-F5344CB8AC3E}">
+        <p14:creationId xmlns:p14="http://schemas.microsoft.com/office/powerpoint/2010/main" val="1752019091"/>
+      </p:ext>
+    </p:extLst>
+  </p:cSld>
+  <p:clrMapOvr>
+    <a:masterClrMapping/>
+  </p:clrMapOvr>
+</p:sld>
+</file>
+
+<file path=ppt/slides/slide7.xml><?xml version="1.0" encoding="utf-8"?>
+<p:sld xmlns:a="http://schemas.openxmlformats.org/drawingml/2006/main" xmlns:r="http://schemas.openxmlformats.org/officeDocument/2006/relationships" xmlns:p="http://schemas.openxmlformats.org/presentationml/2006/main">
+  <p:cSld>
+    <p:spTree>
+      <p:nvGrpSpPr>
+        <p:cNvPr id="1" name=""/>
+        <p:cNvGrpSpPr/>
+        <p:nvPr/>
+      </p:nvGrpSpPr>
+      <p:grpSpPr>
+        <a:xfrm>
+          <a:off x="0" y="0"/>
+          <a:ext cx="0" cy="0"/>
+          <a:chOff x="0" y="0"/>
+          <a:chExt cx="0" cy="0"/>
+        </a:xfrm>
+      </p:grpSpPr>
+      <p:sp>
+        <p:nvSpPr>
+          <p:cNvPr id="2" name="Tytuł 1">
+            <a:extLst>
+              <a:ext uri="{FF2B5EF4-FFF2-40B4-BE49-F238E27FC236}">
+                <a16:creationId xmlns:a16="http://schemas.microsoft.com/office/drawing/2014/main" id="{C0878A23-B92A-7A47-BF02-F4CC707E8DE3}"/>
+              </a:ext>
+            </a:extLst>
+          </p:cNvPr>
+          <p:cNvSpPr>
+            <a:spLocks noGrp="1"/>
+          </p:cNvSpPr>
+          <p:nvPr>
+            <p:ph type="title"/>
+          </p:nvPr>
+        </p:nvSpPr>
+        <p:spPr/>
+        <p:txBody>
+          <a:bodyPr/>
+          <a:lstStyle/>
+          <a:p>
+            <a:r>
+              <a:rPr lang="pl-PL" dirty="0"/>
+              <a:t>Inny przykład: </a:t>
+            </a:r>
+            <a:r>
+              <a:rPr lang="pl-PL" b="1" dirty="0"/>
+              <a:t>silnia</a:t>
+            </a:r>
+          </a:p>
+        </p:txBody>
+      </p:sp>
+      <p:sp>
+        <p:nvSpPr>
+          <p:cNvPr id="3" name="Symbol zastępczy zawartości 2">
+            <a:extLst>
+              <a:ext uri="{FF2B5EF4-FFF2-40B4-BE49-F238E27FC236}">
+                <a16:creationId xmlns:a16="http://schemas.microsoft.com/office/drawing/2014/main" id="{999B1010-B8A2-2F4B-B974-DF090733E966}"/>
+              </a:ext>
+            </a:extLst>
+          </p:cNvPr>
+          <p:cNvSpPr>
+            <a:spLocks noGrp="1"/>
+          </p:cNvSpPr>
+          <p:nvPr>
+            <p:ph idx="1"/>
+          </p:nvPr>
+        </p:nvSpPr>
+        <p:spPr/>
+        <p:txBody>
+          <a:bodyPr/>
+          <a:lstStyle/>
+          <a:p>
+            <a:pPr marL="0" indent="0">
+              <a:buNone/>
+            </a:pPr>
+            <a:r>
+              <a:rPr lang="pl-PL" b="1" dirty="0">
+                <a:latin typeface="Consolas" panose="020B0609020204030204" pitchFamily="49" charset="0"/>
+                <a:cs typeface="Consolas" panose="020B0609020204030204" pitchFamily="49" charset="0"/>
+              </a:rPr>
+              <a:t>3! = 3 * 2!</a:t>
+            </a:r>
+          </a:p>
+          <a:p>
+            <a:r>
+              <a:rPr lang="pl-PL" dirty="0"/>
+              <a:t>Ale najpierw musimy policzyć </a:t>
+            </a:r>
+            <a:r>
+              <a:rPr lang="pl-PL" b="1" dirty="0">
+                <a:latin typeface="Consolas" panose="020B0609020204030204" pitchFamily="49" charset="0"/>
+                <a:cs typeface="Consolas" panose="020B0609020204030204" pitchFamily="49" charset="0"/>
+              </a:rPr>
+              <a:t>2!</a:t>
+            </a:r>
+          </a:p>
+          <a:p>
+            <a:pPr marL="0" indent="0">
+              <a:buNone/>
+            </a:pPr>
+            <a:r>
+              <a:rPr lang="pl-PL" b="1" dirty="0">
+                <a:latin typeface="Consolas" panose="020B0609020204030204" pitchFamily="49" charset="0"/>
+                <a:cs typeface="Consolas" panose="020B0609020204030204" pitchFamily="49" charset="0"/>
+              </a:rPr>
+              <a:t>2! = 2 * </a:t>
+            </a:r>
+            <a:r>
+              <a:rPr lang="pl-PL" b="1" dirty="0">
+                <a:solidFill>
+                  <a:srgbClr val="FF0000"/>
+                </a:solidFill>
+                <a:latin typeface="Consolas" panose="020B0609020204030204" pitchFamily="49" charset="0"/>
+                <a:cs typeface="Consolas" panose="020B0609020204030204" pitchFamily="49" charset="0"/>
+              </a:rPr>
+              <a:t>1!</a:t>
+            </a:r>
+          </a:p>
+          <a:p>
+            <a:r>
+              <a:rPr lang="pl-PL" dirty="0"/>
+              <a:t>Teraz musimy policzyć </a:t>
+            </a:r>
+            <a:r>
+              <a:rPr lang="pl-PL" b="1" dirty="0">
+                <a:solidFill>
+                  <a:srgbClr val="FF0000"/>
+                </a:solidFill>
+                <a:latin typeface="Consolas" panose="020B0609020204030204" pitchFamily="49" charset="0"/>
+                <a:cs typeface="Consolas" panose="020B0609020204030204" pitchFamily="49" charset="0"/>
+              </a:rPr>
+              <a:t>1!</a:t>
+            </a:r>
+          </a:p>
+        </p:txBody>
+      </p:sp>
+    </p:spTree>
+    <p:extLst>
+      <p:ext uri="{BB962C8B-B14F-4D97-AF65-F5344CB8AC3E}">
+        <p14:creationId xmlns:p14="http://schemas.microsoft.com/office/powerpoint/2010/main" val="2718214393"/>
+      </p:ext>
+    </p:extLst>
+  </p:cSld>
+  <p:clrMapOvr>
+    <a:masterClrMapping/>
+  </p:clrMapOvr>
+</p:sld>
+</file>
+
+<file path=ppt/slides/slide8.xml><?xml version="1.0" encoding="utf-8"?>
+<p:sld xmlns:a="http://schemas.openxmlformats.org/drawingml/2006/main" xmlns:r="http://schemas.openxmlformats.org/officeDocument/2006/relationships" xmlns:p="http://schemas.openxmlformats.org/presentationml/2006/main">
+  <p:cSld>
+    <p:spTree>
+      <p:nvGrpSpPr>
+        <p:cNvPr id="1" name=""/>
+        <p:cNvGrpSpPr/>
+        <p:nvPr/>
+      </p:nvGrpSpPr>
+      <p:grpSpPr>
+        <a:xfrm>
+          <a:off x="0" y="0"/>
+          <a:ext cx="0" cy="0"/>
+          <a:chOff x="0" y="0"/>
+          <a:chExt cx="0" cy="0"/>
+        </a:xfrm>
+      </p:grpSpPr>
+      <p:sp>
+        <p:nvSpPr>
+          <p:cNvPr id="2" name="Tytuł 1">
+            <a:extLst>
+              <a:ext uri="{FF2B5EF4-FFF2-40B4-BE49-F238E27FC236}">
+                <a16:creationId xmlns:a16="http://schemas.microsoft.com/office/drawing/2014/main" id="{C0878A23-B92A-7A47-BF02-F4CC707E8DE3}"/>
+              </a:ext>
+            </a:extLst>
+          </p:cNvPr>
+          <p:cNvSpPr>
+            <a:spLocks noGrp="1"/>
+          </p:cNvSpPr>
+          <p:nvPr>
+            <p:ph type="title"/>
+          </p:nvPr>
+        </p:nvSpPr>
+        <p:spPr/>
+        <p:txBody>
+          <a:bodyPr/>
+          <a:lstStyle/>
+          <a:p>
+            <a:r>
+              <a:rPr lang="pl-PL" dirty="0"/>
+              <a:t>Inny przykład: </a:t>
+            </a:r>
+            <a:r>
+              <a:rPr lang="pl-PL" b="1" dirty="0"/>
+              <a:t>silnia</a:t>
+            </a:r>
+          </a:p>
+        </p:txBody>
+      </p:sp>
+      <p:sp>
+        <p:nvSpPr>
+          <p:cNvPr id="3" name="Symbol zastępczy zawartości 2">
+            <a:extLst>
+              <a:ext uri="{FF2B5EF4-FFF2-40B4-BE49-F238E27FC236}">
+                <a16:creationId xmlns:a16="http://schemas.microsoft.com/office/drawing/2014/main" id="{999B1010-B8A2-2F4B-B974-DF090733E966}"/>
+              </a:ext>
+            </a:extLst>
+          </p:cNvPr>
+          <p:cNvSpPr>
+            <a:spLocks noGrp="1"/>
+          </p:cNvSpPr>
+          <p:nvPr>
+            <p:ph idx="1"/>
+          </p:nvPr>
+        </p:nvSpPr>
+        <p:spPr/>
+        <p:txBody>
+          <a:bodyPr/>
+          <a:lstStyle/>
+          <a:p>
+            <a:pPr marL="0" indent="0">
+              <a:buNone/>
+            </a:pPr>
+            <a:r>
+              <a:rPr lang="pl-PL" b="1" dirty="0">
+                <a:latin typeface="Consolas" panose="020B0609020204030204" pitchFamily="49" charset="0"/>
+                <a:cs typeface="Consolas" panose="020B0609020204030204" pitchFamily="49" charset="0"/>
+              </a:rPr>
+              <a:t>3! = 3 * 2!</a:t>
+            </a:r>
+          </a:p>
+          <a:p>
+            <a:r>
+              <a:rPr lang="pl-PL" dirty="0"/>
+              <a:t>Ale najpierw musimy policzyć </a:t>
+            </a:r>
+            <a:r>
+              <a:rPr lang="pl-PL" b="1" dirty="0">
+                <a:latin typeface="Consolas" panose="020B0609020204030204" pitchFamily="49" charset="0"/>
+                <a:cs typeface="Consolas" panose="020B0609020204030204" pitchFamily="49" charset="0"/>
+              </a:rPr>
+              <a:t>2!</a:t>
+            </a:r>
+          </a:p>
+          <a:p>
+            <a:pPr marL="0" indent="0">
+              <a:buNone/>
+            </a:pPr>
+            <a:r>
+              <a:rPr lang="pl-PL" b="1" dirty="0">
+                <a:latin typeface="Consolas" panose="020B0609020204030204" pitchFamily="49" charset="0"/>
+                <a:cs typeface="Consolas" panose="020B0609020204030204" pitchFamily="49" charset="0"/>
+              </a:rPr>
+              <a:t>2! = 2 * 1!</a:t>
+            </a:r>
+          </a:p>
           <a:p>
             <a:r>
               <a:rPr lang="pl-PL" dirty="0"/>
@@ -3903,34 +5278,171 @@
               <a:t>1! = 1</a:t>
             </a:r>
           </a:p>
+        </p:txBody>
+      </p:sp>
+    </p:spTree>
+    <p:extLst>
+      <p:ext uri="{BB962C8B-B14F-4D97-AF65-F5344CB8AC3E}">
+        <p14:creationId xmlns:p14="http://schemas.microsoft.com/office/powerpoint/2010/main" val="3882987538"/>
+      </p:ext>
+    </p:extLst>
+  </p:cSld>
+  <p:clrMapOvr>
+    <a:masterClrMapping/>
+  </p:clrMapOvr>
+</p:sld>
+</file>
+
+<file path=ppt/slides/slide9.xml><?xml version="1.0" encoding="utf-8"?>
+<p:sld xmlns:a="http://schemas.openxmlformats.org/drawingml/2006/main" xmlns:r="http://schemas.openxmlformats.org/officeDocument/2006/relationships" xmlns:p="http://schemas.openxmlformats.org/presentationml/2006/main">
+  <p:cSld>
+    <p:spTree>
+      <p:nvGrpSpPr>
+        <p:cNvPr id="1" name=""/>
+        <p:cNvGrpSpPr/>
+        <p:nvPr/>
+      </p:nvGrpSpPr>
+      <p:grpSpPr>
+        <a:xfrm>
+          <a:off x="0" y="0"/>
+          <a:ext cx="0" cy="0"/>
+          <a:chOff x="0" y="0"/>
+          <a:chExt cx="0" cy="0"/>
+        </a:xfrm>
+      </p:grpSpPr>
+      <p:sp>
+        <p:nvSpPr>
+          <p:cNvPr id="2" name="Tytuł 1">
+            <a:extLst>
+              <a:ext uri="{FF2B5EF4-FFF2-40B4-BE49-F238E27FC236}">
+                <a16:creationId xmlns:a16="http://schemas.microsoft.com/office/drawing/2014/main" id="{C0878A23-B92A-7A47-BF02-F4CC707E8DE3}"/>
+              </a:ext>
+            </a:extLst>
+          </p:cNvPr>
+          <p:cNvSpPr>
+            <a:spLocks noGrp="1"/>
+          </p:cNvSpPr>
+          <p:nvPr>
+            <p:ph type="title"/>
+          </p:nvPr>
+        </p:nvSpPr>
+        <p:spPr/>
+        <p:txBody>
+          <a:bodyPr/>
+          <a:lstStyle/>
           <a:p>
             <a:r>
               <a:rPr lang="pl-PL" dirty="0"/>
-              <a:t>Koniec!</a:t>
-            </a:r>
-          </a:p>
-          <a:p>
-            <a:endParaRPr lang="pl-PL" dirty="0"/>
-          </a:p>
-          <a:p>
-            <a:r>
-              <a:rPr lang="pl-PL" dirty="0"/>
-              <a:t>Ogólnie: </a:t>
-            </a:r>
+              <a:t>Inny przykład: </a:t>
+            </a:r>
+            <a:r>
+              <a:rPr lang="pl-PL" b="1" dirty="0"/>
+              <a:t>silnia</a:t>
+            </a:r>
+          </a:p>
+        </p:txBody>
+      </p:sp>
+      <p:sp>
+        <p:nvSpPr>
+          <p:cNvPr id="3" name="Symbol zastępczy zawartości 2">
+            <a:extLst>
+              <a:ext uri="{FF2B5EF4-FFF2-40B4-BE49-F238E27FC236}">
+                <a16:creationId xmlns:a16="http://schemas.microsoft.com/office/drawing/2014/main" id="{999B1010-B8A2-2F4B-B974-DF090733E966}"/>
+              </a:ext>
+            </a:extLst>
+          </p:cNvPr>
+          <p:cNvSpPr>
+            <a:spLocks noGrp="1"/>
+          </p:cNvSpPr>
+          <p:nvPr>
+            <p:ph idx="1"/>
+          </p:nvPr>
+        </p:nvSpPr>
+        <p:spPr/>
+        <p:txBody>
+          <a:bodyPr/>
+          <a:lstStyle/>
+          <a:p>
+            <a:pPr marL="0" indent="0">
+              <a:buNone/>
+            </a:pPr>
             <a:r>
               <a:rPr lang="pl-PL" b="1" dirty="0">
                 <a:latin typeface="Consolas" panose="020B0609020204030204" pitchFamily="49" charset="0"/>
                 <a:cs typeface="Consolas" panose="020B0609020204030204" pitchFamily="49" charset="0"/>
               </a:rPr>
-              <a:t>n! = n * (n-1)!</a:t>
-            </a:r>
+              <a:t>3! = 3 * 2!</a:t>
+            </a:r>
+          </a:p>
+          <a:p>
+            <a:pPr marL="0" indent="0">
+              <a:buNone/>
+            </a:pPr>
+            <a:endParaRPr lang="pl-PL" b="1" dirty="0">
+              <a:latin typeface="Consolas" panose="020B0609020204030204" pitchFamily="49" charset="0"/>
+              <a:cs typeface="Consolas" panose="020B0609020204030204" pitchFamily="49" charset="0"/>
+            </a:endParaRPr>
+          </a:p>
+          <a:p>
+            <a:pPr marL="0" indent="0">
+              <a:buNone/>
+            </a:pPr>
+            <a:r>
+              <a:rPr lang="pl-PL" b="1" dirty="0">
+                <a:latin typeface="Consolas" panose="020B0609020204030204" pitchFamily="49" charset="0"/>
+                <a:cs typeface="Consolas" panose="020B0609020204030204" pitchFamily="49" charset="0"/>
+              </a:rPr>
+              <a:t>2! = 2 * 1!</a:t>
+            </a:r>
+          </a:p>
+          <a:p>
+            <a:pPr marL="0" indent="0">
+              <a:buNone/>
+            </a:pPr>
+            <a:endParaRPr lang="pl-PL" b="1" dirty="0">
+              <a:latin typeface="Consolas" panose="020B0609020204030204" pitchFamily="49" charset="0"/>
+              <a:cs typeface="Consolas" panose="020B0609020204030204" pitchFamily="49" charset="0"/>
+            </a:endParaRPr>
+          </a:p>
+          <a:p>
+            <a:pPr marL="0" indent="0">
+              <a:buNone/>
+            </a:pPr>
+            <a:r>
+              <a:rPr lang="pl-PL" b="1" dirty="0">
+                <a:latin typeface="Consolas" panose="020B0609020204030204" pitchFamily="49" charset="0"/>
+                <a:cs typeface="Consolas" panose="020B0609020204030204" pitchFamily="49" charset="0"/>
+              </a:rPr>
+              <a:t>1! = 1</a:t>
+            </a:r>
+          </a:p>
+          <a:p>
+            <a:r>
+              <a:rPr lang="pl-PL" dirty="0"/>
+              <a:t>Mamy wynik, możemy </a:t>
+            </a:r>
+            <a:r>
+              <a:rPr lang="pl-PL" b="1" dirty="0">
+                <a:solidFill>
+                  <a:srgbClr val="FF0000"/>
+                </a:solidFill>
+              </a:rPr>
+              <a:t>wracać</a:t>
+            </a:r>
+            <a:endParaRPr lang="pl-PL" b="1" dirty="0">
+              <a:solidFill>
+                <a:srgbClr val="FF0000"/>
+              </a:solidFill>
+              <a:latin typeface="Consolas" panose="020B0609020204030204" pitchFamily="49" charset="0"/>
+              <a:cs typeface="Consolas" panose="020B0609020204030204" pitchFamily="49" charset="0"/>
+            </a:endParaRPr>
           </a:p>
         </p:txBody>
       </p:sp>
     </p:spTree>
     <p:extLst>
       <p:ext uri="{BB962C8B-B14F-4D97-AF65-F5344CB8AC3E}">
-        <p14:creationId xmlns:p14="http://schemas.microsoft.com/office/powerpoint/2010/main" val="3775809350"/>
+        <p14:creationId xmlns:p14="http://schemas.microsoft.com/office/powerpoint/2010/main" val="1492300038"/>
       </p:ext>
     </p:extLst>
   </p:cSld>

</xml_diff>